<commit_message>
Updated job market session poster
</commit_message>
<xml_diff>
--- a/posters/2024_spring/job_market_240416.pptx
+++ b/posters/2024_spring/job_market_240416.pptx
@@ -254,7 +254,7 @@
       <p15:sldGuideLst xmlns:p15="http://schemas.microsoft.com/office/powerpoint/2012/main"/>
     </p:ext>
     <p:ext uri="http://customooxmlschemas.google.com/">
-      <go:slidesCustomData xmlns:go="http://customooxmlschemas.google.com/" xmlns:ahyp="http://schemas.microsoft.com/office/drawing/2018/hyperlinkcolor" xmlns:p15="http://schemas.microsoft.com/office/powerpoint/2012/main" xmlns:p14="http://schemas.microsoft.com/office/powerpoint/2010/main" xmlns:com="http://schemas.openxmlformats.org/drawingml/2006/compatibility" xmlns:pvml="urn:schemas-microsoft-com:office:powerpoint" xmlns:v="urn:schemas-microsoft-com:vml" xmlns:o="urn:schemas-microsoft-com:office:office" xmlns:dgm="http://schemas.openxmlformats.org/drawingml/2006/diagram" xmlns:c="http://schemas.openxmlformats.org/drawingml/2006/chart" xmlns:mv="urn:schemas-microsoft-com:mac:vml" xmlns:mc="http://schemas.openxmlformats.org/markup-compatibility/2006" xmlns="" r:id="rId12" roundtripDataSignature="AMtx7mj9Ic0Cos0+1WxzYeHFBp4wMVEnvg=="/>
+      <go:slidesCustomData xmlns="" xmlns:mc="http://schemas.openxmlformats.org/markup-compatibility/2006" xmlns:mv="urn:schemas-microsoft-com:mac:vml" xmlns:c="http://schemas.openxmlformats.org/drawingml/2006/chart" xmlns:dgm="http://schemas.openxmlformats.org/drawingml/2006/diagram" xmlns:o="urn:schemas-microsoft-com:office:office" xmlns:v="urn:schemas-microsoft-com:vml" xmlns:pvml="urn:schemas-microsoft-com:office:powerpoint" xmlns:com="http://schemas.openxmlformats.org/drawingml/2006/compatibility" xmlns:p14="http://schemas.microsoft.com/office/powerpoint/2010/main" xmlns:p15="http://schemas.microsoft.com/office/powerpoint/2012/main" xmlns:ahyp="http://schemas.microsoft.com/office/drawing/2018/hyperlinkcolor" xmlns:go="http://customooxmlschemas.google.com/" r:id="rId12" roundtripDataSignature="AMtx7mj9Ic0Cos0+1WxzYeHFBp4wMVEnvg=="/>
     </p:ext>
   </p:extLst>
 </p:presentation>
@@ -11291,31 +11291,7 @@
                 <a:cs typeface="Calibri"/>
                 <a:sym typeface="Calibri"/>
               </a:rPr>
-              <a:t>-Yun Liu, Caitlyn </a:t>
-            </a:r>
-            <a:r>
-              <a:rPr lang="en-US" sz="3200" b="1" dirty="0" err="1">
-                <a:solidFill>
-                  <a:schemeClr val="dk1"/>
-                </a:solidFill>
-                <a:latin typeface="LM Roman 12" panose="00000500000000000000" pitchFamily="50" charset="0"/>
-                <a:ea typeface="Calibri"/>
-                <a:cs typeface="Calibri"/>
-                <a:sym typeface="Calibri"/>
-              </a:rPr>
-              <a:t>Keo</a:t>
-            </a:r>
-            <a:r>
-              <a:rPr lang="en-US" sz="3200" b="1" dirty="0">
-                <a:solidFill>
-                  <a:schemeClr val="dk1"/>
-                </a:solidFill>
-                <a:latin typeface="LM Roman 12" panose="00000500000000000000" pitchFamily="50" charset="0"/>
-                <a:ea typeface="Calibri"/>
-                <a:cs typeface="Calibri"/>
-                <a:sym typeface="Calibri"/>
-              </a:rPr>
-              <a:t>, </a:t>
+              <a:t>-Yun Liu, Rebecca Weir, </a:t>
             </a:r>
           </a:p>
           <a:p>
@@ -11437,6 +11413,18 @@
               <a:buNone/>
             </a:pPr>
             <a:r>
+              <a:rPr lang="en-US" sz="2400" dirty="0">
+                <a:solidFill>
+                  <a:srgbClr val="900021"/>
+                </a:solidFill>
+                <a:latin typeface="LM Roman 12" panose="00000500000000000000" pitchFamily="50" charset="0"/>
+                <a:ea typeface="Calibri"/>
+                <a:cs typeface="Calibri"/>
+                <a:sym typeface="Calibri"/>
+              </a:rPr>
+              <a:t>1:30</a:t>
+            </a:r>
+            <a:r>
               <a:rPr lang="en-US" sz="2400" b="0" i="0" u="none" strike="noStrike" cap="none" dirty="0">
                 <a:solidFill>
                   <a:srgbClr val="900021"/>
@@ -11446,7 +11434,7 @@
                 <a:cs typeface="Calibri"/>
                 <a:sym typeface="Calibri"/>
               </a:rPr>
-              <a:t>12 PM – 1 PM </a:t>
+              <a:t> PM – 2:30 PM </a:t>
             </a:r>
             <a:r>
               <a:rPr lang="en-US" sz="2400" dirty="0" err="1">
@@ -11474,33 +11462,8 @@
                 <a:cs typeface="Calibri"/>
                 <a:sym typeface="Calibri"/>
               </a:rPr>
-              <a:t> </a:t>
+              <a:t> Hall B42</a:t>
             </a:r>
-            <a:r>
-              <a:rPr lang="en-US" sz="2400">
-                <a:solidFill>
-                  <a:schemeClr val="tx1">
-                    <a:lumMod val="95000"/>
-                    <a:lumOff val="5000"/>
-                  </a:schemeClr>
-                </a:solidFill>
-                <a:latin typeface="LM Roman 12" panose="00000500000000000000" pitchFamily="50" charset="0"/>
-                <a:cs typeface="Calibri"/>
-                <a:sym typeface="Calibri"/>
-              </a:rPr>
-              <a:t>Hall B35</a:t>
-            </a:r>
-            <a:endParaRPr lang="en-US" sz="2400" dirty="0">
-              <a:solidFill>
-                <a:schemeClr val="tx1">
-                  <a:lumMod val="95000"/>
-                  <a:lumOff val="5000"/>
-                </a:schemeClr>
-              </a:solidFill>
-              <a:latin typeface="LM Roman 12" panose="00000500000000000000" pitchFamily="50" charset="0"/>
-              <a:cs typeface="Calibri"/>
-              <a:sym typeface="Calibri"/>
-            </a:endParaRPr>
           </a:p>
           <a:p>
             <a:pPr marL="114300" marR="114300" lvl="0" indent="0" algn="ctr" rtl="0">
@@ -11824,8 +11787,8 @@
         </p:blipFill>
         <p:spPr>
           <a:xfrm>
-            <a:off x="2799818" y="2210684"/>
-            <a:ext cx="1561735" cy="1914876"/>
+            <a:off x="2723742" y="2226660"/>
+            <a:ext cx="1713887" cy="1890613"/>
           </a:xfrm>
           <a:prstGeom prst="rect">
             <a:avLst/>

</xml_diff>